<commit_message>
fix: NGINX Plus OIDC workflow
</commit_message>
<xml_diff>
--- a/docs/img/nginx-oidc-flow.pptx
+++ b/docs/img/nginx-oidc-flow.pptx
@@ -259,7 +259,7 @@
           <a:p>
             <a:fld id="{FD36D0CE-793F-FB41-AD4F-0C45D94A4FBD}" type="datetimeFigureOut">
               <a:rPr lang="en-US" smtClean="0"/>
-              <a:t>9/21/22</a:t>
+              <a:t>9/28/22</a:t>
             </a:fld>
             <a:endParaRPr lang="en-US"/>
           </a:p>
@@ -457,7 +457,7 @@
           <a:p>
             <a:fld id="{FD36D0CE-793F-FB41-AD4F-0C45D94A4FBD}" type="datetimeFigureOut">
               <a:rPr lang="en-US" smtClean="0"/>
-              <a:t>9/21/22</a:t>
+              <a:t>9/28/22</a:t>
             </a:fld>
             <a:endParaRPr lang="en-US"/>
           </a:p>
@@ -665,7 +665,7 @@
           <a:p>
             <a:fld id="{FD36D0CE-793F-FB41-AD4F-0C45D94A4FBD}" type="datetimeFigureOut">
               <a:rPr lang="en-US" smtClean="0"/>
-              <a:t>9/21/22</a:t>
+              <a:t>9/28/22</a:t>
             </a:fld>
             <a:endParaRPr lang="en-US"/>
           </a:p>
@@ -863,7 +863,7 @@
           <a:p>
             <a:fld id="{FD36D0CE-793F-FB41-AD4F-0C45D94A4FBD}" type="datetimeFigureOut">
               <a:rPr lang="en-US" smtClean="0"/>
-              <a:t>9/21/22</a:t>
+              <a:t>9/28/22</a:t>
             </a:fld>
             <a:endParaRPr lang="en-US"/>
           </a:p>
@@ -1138,7 +1138,7 @@
           <a:p>
             <a:fld id="{FD36D0CE-793F-FB41-AD4F-0C45D94A4FBD}" type="datetimeFigureOut">
               <a:rPr lang="en-US" smtClean="0"/>
-              <a:t>9/21/22</a:t>
+              <a:t>9/28/22</a:t>
             </a:fld>
             <a:endParaRPr lang="en-US"/>
           </a:p>
@@ -1403,7 +1403,7 @@
           <a:p>
             <a:fld id="{FD36D0CE-793F-FB41-AD4F-0C45D94A4FBD}" type="datetimeFigureOut">
               <a:rPr lang="en-US" smtClean="0"/>
-              <a:t>9/21/22</a:t>
+              <a:t>9/28/22</a:t>
             </a:fld>
             <a:endParaRPr lang="en-US"/>
           </a:p>
@@ -1815,7 +1815,7 @@
           <a:p>
             <a:fld id="{FD36D0CE-793F-FB41-AD4F-0C45D94A4FBD}" type="datetimeFigureOut">
               <a:rPr lang="en-US" smtClean="0"/>
-              <a:t>9/21/22</a:t>
+              <a:t>9/28/22</a:t>
             </a:fld>
             <a:endParaRPr lang="en-US"/>
           </a:p>
@@ -1956,7 +1956,7 @@
           <a:p>
             <a:fld id="{FD36D0CE-793F-FB41-AD4F-0C45D94A4FBD}" type="datetimeFigureOut">
               <a:rPr lang="en-US" smtClean="0"/>
-              <a:t>9/21/22</a:t>
+              <a:t>9/28/22</a:t>
             </a:fld>
             <a:endParaRPr lang="en-US"/>
           </a:p>
@@ -2069,7 +2069,7 @@
           <a:p>
             <a:fld id="{FD36D0CE-793F-FB41-AD4F-0C45D94A4FBD}" type="datetimeFigureOut">
               <a:rPr lang="en-US" smtClean="0"/>
-              <a:t>9/21/22</a:t>
+              <a:t>9/28/22</a:t>
             </a:fld>
             <a:endParaRPr lang="en-US"/>
           </a:p>
@@ -2380,7 +2380,7 @@
           <a:p>
             <a:fld id="{FD36D0CE-793F-FB41-AD4F-0C45D94A4FBD}" type="datetimeFigureOut">
               <a:rPr lang="en-US" smtClean="0"/>
-              <a:t>9/21/22</a:t>
+              <a:t>9/28/22</a:t>
             </a:fld>
             <a:endParaRPr lang="en-US"/>
           </a:p>
@@ -2668,7 +2668,7 @@
           <a:p>
             <a:fld id="{FD36D0CE-793F-FB41-AD4F-0C45D94A4FBD}" type="datetimeFigureOut">
               <a:rPr lang="en-US" smtClean="0"/>
-              <a:t>9/21/22</a:t>
+              <a:t>9/28/22</a:t>
             </a:fld>
             <a:endParaRPr lang="en-US"/>
           </a:p>
@@ -2909,7 +2909,7 @@
           <a:p>
             <a:fld id="{FD36D0CE-793F-FB41-AD4F-0C45D94A4FBD}" type="datetimeFigureOut">
               <a:rPr lang="en-US" smtClean="0"/>
-              <a:t>9/21/22</a:t>
+              <a:t>9/28/22</a:t>
             </a:fld>
             <a:endParaRPr lang="en-US"/>
           </a:p>
@@ -6011,10 +6011,10 @@
       </p:sp>
       <p:pic>
         <p:nvPicPr>
-          <p:cNvPr id="3" name="Picture 2" descr="Okta Identity Management Review | PCMag">
-            <a:extLst>
-              <a:ext uri="{FF2B5EF4-FFF2-40B4-BE49-F238E27FC236}">
-                <a16:creationId xmlns:a16="http://schemas.microsoft.com/office/drawing/2014/main" id="{21E41C5C-BD37-49A7-9EEC-DC6DB522F138}"/>
+          <p:cNvPr id="1026" name="Picture 2" descr="Visitor Management Software With Azure Active Directory Integration">
+            <a:extLst>
+              <a:ext uri="{FF2B5EF4-FFF2-40B4-BE49-F238E27FC236}">
+                <a16:creationId xmlns:a16="http://schemas.microsoft.com/office/drawing/2014/main" id="{98614F7B-B1AF-24E8-DAAA-AFC82B3227BB}"/>
               </a:ext>
             </a:extLst>
           </p:cNvPr>
@@ -6038,8 +6038,8 @@
         </p:blipFill>
         <p:spPr bwMode="auto">
           <a:xfrm>
-            <a:off x="7436566" y="1797800"/>
-            <a:ext cx="901718" cy="506651"/>
+            <a:off x="7325153" y="1917898"/>
+            <a:ext cx="1113573" cy="334889"/>
           </a:xfrm>
           <a:prstGeom prst="rect">
             <a:avLst/>

</xml_diff>